<commit_message>
added link to git
</commit_message>
<xml_diff>
--- a/ROP SCC talk.pptx
+++ b/ROP SCC talk.pptx
@@ -35,8 +35,8 @@
     <p:sldId id="298" r:id="rId26"/>
     <p:sldId id="296" r:id="rId27"/>
     <p:sldId id="306" r:id="rId28"/>
-    <p:sldId id="299" r:id="rId29"/>
-    <p:sldId id="297" r:id="rId30"/>
+    <p:sldId id="297" r:id="rId29"/>
+    <p:sldId id="299" r:id="rId30"/>
   </p:sldIdLst>
   <p:sldSz cx="12192000" cy="6858000"/>
   <p:notesSz cx="6858000" cy="9144000"/>
@@ -167,8 +167,8 @@
             <p14:sldId id="298"/>
             <p14:sldId id="296"/>
             <p14:sldId id="306"/>
+            <p14:sldId id="297"/>
             <p14:sldId id="299"/>
-            <p14:sldId id="297"/>
           </p14:sldIdLst>
         </p14:section>
       </p14:sectionLst>
@@ -8439,11 +8439,7 @@
           <a:p>
             <a:r>
               <a:rPr lang="en-US" sz="3600" dirty="0" smtClean="0"/>
-              <a:t>Software </a:t>
-            </a:r>
-            <a:r>
-              <a:rPr lang="en-US" sz="3600" dirty="0" smtClean="0"/>
-              <a:t>Engineer @ Quicken Loans</a:t>
+              <a:t>Software Engineer @ Quicken Loans</a:t>
             </a:r>
           </a:p>
           <a:p>
@@ -8458,7 +8454,6 @@
               <a:rPr lang="en-US" sz="3400" dirty="0" smtClean="0"/>
               <a:t>Yes it’s better Dave Bourke, I don’t care about being PC</a:t>
             </a:r>
-            <a:endParaRPr lang="en-US" sz="3400" dirty="0" smtClean="0"/>
           </a:p>
           <a:p>
             <a:r>
@@ -8495,7 +8490,6 @@
               <a:rPr lang="en-US" sz="3600" dirty="0" smtClean="0"/>
               <a:t> </a:t>
             </a:r>
-            <a:endParaRPr lang="en-US" sz="3600" dirty="0" smtClean="0"/>
           </a:p>
           <a:p>
             <a:pPr marL="0" indent="0">
@@ -8999,11 +8993,7 @@
           <a:p>
             <a:r>
               <a:rPr lang="en-US" sz="5400" dirty="0" smtClean="0"/>
-              <a:t>Two </a:t>
-            </a:r>
-            <a:r>
-              <a:rPr lang="en-US" sz="5400" dirty="0" smtClean="0"/>
-              <a:t>Track Result</a:t>
+              <a:t>Two Track Result</a:t>
             </a:r>
             <a:endParaRPr lang="en-US" sz="5400" dirty="0"/>
           </a:p>
@@ -9258,11 +9248,7 @@
           <a:p>
             <a:r>
               <a:rPr lang="en-US" sz="5400" dirty="0" smtClean="0"/>
-              <a:t>Two </a:t>
-            </a:r>
-            <a:r>
-              <a:rPr lang="en-US" sz="5400" dirty="0" smtClean="0"/>
-              <a:t>Track Result</a:t>
+              <a:t>Two Track Result</a:t>
             </a:r>
             <a:endParaRPr lang="en-US" sz="5400" dirty="0"/>
           </a:p>
@@ -11021,7 +11007,7 @@
           <a:p>
             <a:r>
               <a:rPr lang="en-US" sz="7200" dirty="0" smtClean="0"/>
-              <a:t>Thank You</a:t>
+              <a:t>Other Topics</a:t>
             </a:r>
             <a:endParaRPr lang="en-US" sz="7200" dirty="0"/>
           </a:p>
@@ -11039,44 +11025,47 @@
         </p:nvSpPr>
         <p:spPr/>
         <p:txBody>
-          <a:bodyPr/>
+          <a:bodyPr>
+            <a:normAutofit fontScale="85000" lnSpcReduction="10000"/>
+          </a:bodyPr>
           <a:lstStyle/>
           <a:p>
             <a:r>
               <a:rPr lang="en-US" sz="3600" dirty="0" smtClean="0"/>
-              <a:t>Dominick </a:t>
-            </a:r>
-            <a:r>
-              <a:rPr lang="en-US" sz="3600" dirty="0" err="1" smtClean="0"/>
-              <a:t>Aleardi</a:t>
-            </a:r>
+              <a:t>Injecting functions into flow based on application inputs/configuration</a:t>
+            </a:r>
+          </a:p>
+          <a:p>
             <a:r>
               <a:rPr lang="en-US" sz="3600" dirty="0" smtClean="0"/>
-              <a:t> </a:t>
+              <a:t>Adding Warning Messages to your success type</a:t>
             </a:r>
           </a:p>
           <a:p>
             <a:r>
               <a:rPr lang="en-US" sz="3600" dirty="0" smtClean="0"/>
-              <a:t>Software Engineer @ Quicken Loans</a:t>
-            </a:r>
-          </a:p>
-          <a:p>
-            <a:r>
-              <a:rPr lang="en-US" sz="3600" dirty="0" smtClean="0">
-                <a:hlinkClick r:id="rId2"/>
-              </a:rPr>
-              <a:t>Daleardi@Gmail.com</a:t>
-            </a:r>
+              <a:t>Adding Warning Type: Three track model</a:t>
+            </a:r>
+          </a:p>
+          <a:p>
             <a:r>
               <a:rPr lang="en-US" sz="3600" dirty="0" smtClean="0"/>
-              <a:t> </a:t>
-            </a:r>
-          </a:p>
-          <a:p>
-            <a:pPr marL="0" indent="0">
-              <a:buNone/>
-            </a:pPr>
+              <a:t>Doing this asynchronously </a:t>
+            </a:r>
+          </a:p>
+          <a:p>
+            <a:r>
+              <a:rPr lang="en-US" sz="3600" dirty="0" smtClean="0"/>
+              <a:t>Creating Computation Expression to do this </a:t>
+            </a:r>
+          </a:p>
+          <a:p>
+            <a:r>
+              <a:rPr lang="en-US" sz="3600" dirty="0" smtClean="0"/>
+              <a:t>Read Scott W.’s blog!</a:t>
+            </a:r>
+          </a:p>
+          <a:p>
             <a:endParaRPr lang="en-US" dirty="0"/>
           </a:p>
         </p:txBody>
@@ -11084,7 +11073,7 @@
     </p:spTree>
     <p:extLst>
       <p:ext uri="{BB962C8B-B14F-4D97-AF65-F5344CB8AC3E}">
-        <p14:creationId xmlns:p14="http://schemas.microsoft.com/office/powerpoint/2010/main" val="2627309380"/>
+        <p14:creationId xmlns:p14="http://schemas.microsoft.com/office/powerpoint/2010/main" val="756987525"/>
       </p:ext>
     </p:extLst>
   </p:cSld>
@@ -11135,7 +11124,7 @@
           <a:p>
             <a:r>
               <a:rPr lang="en-US" sz="7200" dirty="0" smtClean="0"/>
-              <a:t>Other Topics</a:t>
+              <a:t>Thank You</a:t>
             </a:r>
             <a:endParaRPr lang="en-US" sz="7200" dirty="0"/>
           </a:p>
@@ -11153,47 +11142,13 @@
         </p:nvSpPr>
         <p:spPr/>
         <p:txBody>
-          <a:bodyPr>
-            <a:normAutofit fontScale="85000" lnSpcReduction="10000"/>
-          </a:bodyPr>
-          <a:lstStyle/>
-          <a:p>
-            <a:r>
-              <a:rPr lang="en-US" sz="3600" dirty="0" smtClean="0"/>
-              <a:t>Injecting functions into flow based on application inputs/configuration</a:t>
-            </a:r>
-          </a:p>
-          <a:p>
-            <a:r>
-              <a:rPr lang="en-US" sz="3600" dirty="0" smtClean="0"/>
-              <a:t>Adding Warning Messages to your success type</a:t>
-            </a:r>
-          </a:p>
-          <a:p>
-            <a:r>
-              <a:rPr lang="en-US" sz="3600" dirty="0" smtClean="0"/>
-              <a:t>Adding Warning Type: Three track model</a:t>
-            </a:r>
-          </a:p>
-          <a:p>
-            <a:r>
-              <a:rPr lang="en-US" sz="3600" dirty="0" smtClean="0"/>
-              <a:t>Doing this asynchronously </a:t>
-            </a:r>
-          </a:p>
-          <a:p>
-            <a:r>
-              <a:rPr lang="en-US" sz="3600" dirty="0" smtClean="0"/>
-              <a:t>Creating Computation Expression to do this </a:t>
-            </a:r>
-          </a:p>
-          <a:p>
-            <a:r>
-              <a:rPr lang="en-US" sz="3600" dirty="0" smtClean="0"/>
-              <a:t>Read Scott W.’s blog!</a:t>
-            </a:r>
-          </a:p>
-          <a:p>
+          <a:bodyPr/>
+          <a:lstStyle/>
+          <a:p>
+            <a:r>
+              <a:rPr lang="en-US" sz="3600" dirty="0"/>
+              <a:t>http://git/daleardi/ROPTalk.git</a:t>
+            </a:r>
             <a:endParaRPr lang="en-US" dirty="0"/>
           </a:p>
         </p:txBody>
@@ -11201,7 +11156,7 @@
     </p:spTree>
     <p:extLst>
       <p:ext uri="{BB962C8B-B14F-4D97-AF65-F5344CB8AC3E}">
-        <p14:creationId xmlns:p14="http://schemas.microsoft.com/office/powerpoint/2010/main" val="756987525"/>
+        <p14:creationId xmlns:p14="http://schemas.microsoft.com/office/powerpoint/2010/main" val="2627309380"/>
       </p:ext>
     </p:extLst>
   </p:cSld>
@@ -13013,11 +12968,7 @@
             </a:r>
             <a:r>
               <a:rPr lang="en-US" sz="2800" dirty="0" smtClean="0"/>
-              <a:t>Line. It negates the purpose of static types</a:t>
-            </a:r>
-            <a:r>
-              <a:rPr lang="en-US" sz="2800" dirty="0" smtClean="0"/>
-              <a:t>!</a:t>
+              <a:t>Line. It negates the purpose of static types!</a:t>
             </a:r>
           </a:p>
           <a:p>

</xml_diff>

<commit_message>
added slide for type questions
</commit_message>
<xml_diff>
--- a/ROP SCC talk.pptx
+++ b/ROP SCC talk.pptx
@@ -5,38 +5,39 @@
     <p:sldMasterId id="2147483669" r:id="rId1"/>
   </p:sldMasterIdLst>
   <p:notesMasterIdLst>
-    <p:notesMasterId r:id="rId31"/>
+    <p:notesMasterId r:id="rId32"/>
   </p:notesMasterIdLst>
   <p:sldIdLst>
     <p:sldId id="307" r:id="rId2"/>
     <p:sldId id="256" r:id="rId3"/>
     <p:sldId id="264" r:id="rId4"/>
     <p:sldId id="269" r:id="rId5"/>
-    <p:sldId id="258" r:id="rId6"/>
-    <p:sldId id="301" r:id="rId7"/>
-    <p:sldId id="303" r:id="rId8"/>
-    <p:sldId id="305" r:id="rId9"/>
-    <p:sldId id="300" r:id="rId10"/>
-    <p:sldId id="271" r:id="rId11"/>
-    <p:sldId id="270" r:id="rId12"/>
-    <p:sldId id="257" r:id="rId13"/>
-    <p:sldId id="274" r:id="rId14"/>
-    <p:sldId id="276" r:id="rId15"/>
-    <p:sldId id="280" r:id="rId16"/>
-    <p:sldId id="275" r:id="rId17"/>
-    <p:sldId id="278" r:id="rId18"/>
-    <p:sldId id="285" r:id="rId19"/>
-    <p:sldId id="273" r:id="rId20"/>
-    <p:sldId id="283" r:id="rId21"/>
-    <p:sldId id="286" r:id="rId22"/>
-    <p:sldId id="288" r:id="rId23"/>
-    <p:sldId id="287" r:id="rId24"/>
-    <p:sldId id="289" r:id="rId25"/>
-    <p:sldId id="298" r:id="rId26"/>
-    <p:sldId id="296" r:id="rId27"/>
-    <p:sldId id="306" r:id="rId28"/>
-    <p:sldId id="297" r:id="rId29"/>
-    <p:sldId id="299" r:id="rId30"/>
+    <p:sldId id="308" r:id="rId6"/>
+    <p:sldId id="258" r:id="rId7"/>
+    <p:sldId id="301" r:id="rId8"/>
+    <p:sldId id="303" r:id="rId9"/>
+    <p:sldId id="305" r:id="rId10"/>
+    <p:sldId id="300" r:id="rId11"/>
+    <p:sldId id="271" r:id="rId12"/>
+    <p:sldId id="270" r:id="rId13"/>
+    <p:sldId id="257" r:id="rId14"/>
+    <p:sldId id="274" r:id="rId15"/>
+    <p:sldId id="276" r:id="rId16"/>
+    <p:sldId id="280" r:id="rId17"/>
+    <p:sldId id="275" r:id="rId18"/>
+    <p:sldId id="278" r:id="rId19"/>
+    <p:sldId id="285" r:id="rId20"/>
+    <p:sldId id="273" r:id="rId21"/>
+    <p:sldId id="283" r:id="rId22"/>
+    <p:sldId id="286" r:id="rId23"/>
+    <p:sldId id="288" r:id="rId24"/>
+    <p:sldId id="287" r:id="rId25"/>
+    <p:sldId id="289" r:id="rId26"/>
+    <p:sldId id="298" r:id="rId27"/>
+    <p:sldId id="296" r:id="rId28"/>
+    <p:sldId id="306" r:id="rId29"/>
+    <p:sldId id="297" r:id="rId30"/>
+    <p:sldId id="299" r:id="rId31"/>
   </p:sldIdLst>
   <p:sldSz cx="12192000" cy="6858000"/>
   <p:notesSz cx="6858000" cy="9144000"/>
@@ -144,6 +145,7 @@
             <p14:sldId id="256"/>
             <p14:sldId id="264"/>
             <p14:sldId id="269"/>
+            <p14:sldId id="308"/>
             <p14:sldId id="258"/>
             <p14:sldId id="301"/>
             <p14:sldId id="303"/>
@@ -274,7 +276,7 @@
           <a:p>
             <a:fld id="{877E9864-FF97-476A-BE0F-FCE81E235674}" type="datetimeFigureOut">
               <a:rPr lang="en-US" smtClean="0"/>
-              <a:t>4/4/2016</a:t>
+              <a:t>4/6/2016</a:t>
             </a:fld>
             <a:endParaRPr lang="en-US"/>
           </a:p>
@@ -742,7 +744,7 @@
           <a:p>
             <a:fld id="{377144E2-9EBE-4751-96F2-3D75627916BE}" type="slidenum">
               <a:rPr lang="en-US" smtClean="0"/>
-              <a:t>12</a:t>
+              <a:t>13</a:t>
             </a:fld>
             <a:endParaRPr lang="en-US"/>
           </a:p>
@@ -834,7 +836,7 @@
           <a:p>
             <a:fld id="{377144E2-9EBE-4751-96F2-3D75627916BE}" type="slidenum">
               <a:rPr lang="en-US" smtClean="0"/>
-              <a:t>13</a:t>
+              <a:t>14</a:t>
             </a:fld>
             <a:endParaRPr lang="en-US"/>
           </a:p>
@@ -918,7 +920,7 @@
           <a:p>
             <a:fld id="{377144E2-9EBE-4751-96F2-3D75627916BE}" type="slidenum">
               <a:rPr lang="en-US" smtClean="0"/>
-              <a:t>14</a:t>
+              <a:t>15</a:t>
             </a:fld>
             <a:endParaRPr lang="en-US"/>
           </a:p>
@@ -1002,7 +1004,7 @@
           <a:p>
             <a:fld id="{377144E2-9EBE-4751-96F2-3D75627916BE}" type="slidenum">
               <a:rPr lang="en-US" smtClean="0"/>
-              <a:t>15</a:t>
+              <a:t>16</a:t>
             </a:fld>
             <a:endParaRPr lang="en-US"/>
           </a:p>
@@ -1086,7 +1088,7 @@
           <a:p>
             <a:fld id="{377144E2-9EBE-4751-96F2-3D75627916BE}" type="slidenum">
               <a:rPr lang="en-US" smtClean="0"/>
-              <a:t>16</a:t>
+              <a:t>17</a:t>
             </a:fld>
             <a:endParaRPr lang="en-US"/>
           </a:p>
@@ -1174,7 +1176,7 @@
           <a:p>
             <a:fld id="{377144E2-9EBE-4751-96F2-3D75627916BE}" type="slidenum">
               <a:rPr lang="en-US" smtClean="0"/>
-              <a:t>17</a:t>
+              <a:t>18</a:t>
             </a:fld>
             <a:endParaRPr lang="en-US"/>
           </a:p>
@@ -1262,7 +1264,7 @@
           <a:p>
             <a:fld id="{377144E2-9EBE-4751-96F2-3D75627916BE}" type="slidenum">
               <a:rPr lang="en-US" smtClean="0"/>
-              <a:t>20</a:t>
+              <a:t>21</a:t>
             </a:fld>
             <a:endParaRPr lang="en-US"/>
           </a:p>
@@ -1346,7 +1348,7 @@
           <a:p>
             <a:fld id="{377144E2-9EBE-4751-96F2-3D75627916BE}" type="slidenum">
               <a:rPr lang="en-US" smtClean="0"/>
-              <a:t>21</a:t>
+              <a:t>22</a:t>
             </a:fld>
             <a:endParaRPr lang="en-US"/>
           </a:p>
@@ -1430,7 +1432,7 @@
           <a:p>
             <a:fld id="{377144E2-9EBE-4751-96F2-3D75627916BE}" type="slidenum">
               <a:rPr lang="en-US" smtClean="0"/>
-              <a:t>22</a:t>
+              <a:t>23</a:t>
             </a:fld>
             <a:endParaRPr lang="en-US"/>
           </a:p>
@@ -1518,7 +1520,7 @@
           <a:p>
             <a:fld id="{377144E2-9EBE-4751-96F2-3D75627916BE}" type="slidenum">
               <a:rPr lang="en-US" smtClean="0"/>
-              <a:t>24</a:t>
+              <a:t>25</a:t>
             </a:fld>
             <a:endParaRPr lang="en-US"/>
           </a:p>
@@ -1694,7 +1696,7 @@
           <a:p>
             <a:fld id="{377144E2-9EBE-4751-96F2-3D75627916BE}" type="slidenum">
               <a:rPr lang="en-US" smtClean="0"/>
-              <a:t>25</a:t>
+              <a:t>26</a:t>
             </a:fld>
             <a:endParaRPr lang="en-US"/>
           </a:p>
@@ -1778,7 +1780,7 @@
           <a:p>
             <a:fld id="{377144E2-9EBE-4751-96F2-3D75627916BE}" type="slidenum">
               <a:rPr lang="en-US" smtClean="0"/>
-              <a:t>27</a:t>
+              <a:t>28</a:t>
             </a:fld>
             <a:endParaRPr lang="en-US"/>
           </a:p>
@@ -1870,7 +1872,7 @@
           <a:p>
             <a:fld id="{377144E2-9EBE-4751-96F2-3D75627916BE}" type="slidenum">
               <a:rPr lang="en-US" smtClean="0"/>
-              <a:t>5</a:t>
+              <a:t>6</a:t>
             </a:fld>
             <a:endParaRPr lang="en-US"/>
           </a:p>
@@ -1954,7 +1956,7 @@
           <a:p>
             <a:fld id="{377144E2-9EBE-4751-96F2-3D75627916BE}" type="slidenum">
               <a:rPr lang="en-US" smtClean="0"/>
-              <a:t>6</a:t>
+              <a:t>7</a:t>
             </a:fld>
             <a:endParaRPr lang="en-US"/>
           </a:p>
@@ -2038,7 +2040,7 @@
           <a:p>
             <a:fld id="{377144E2-9EBE-4751-96F2-3D75627916BE}" type="slidenum">
               <a:rPr lang="en-US" smtClean="0"/>
-              <a:t>7</a:t>
+              <a:t>8</a:t>
             </a:fld>
             <a:endParaRPr lang="en-US"/>
           </a:p>
@@ -2122,7 +2124,7 @@
           <a:p>
             <a:fld id="{377144E2-9EBE-4751-96F2-3D75627916BE}" type="slidenum">
               <a:rPr lang="en-US" smtClean="0"/>
-              <a:t>8</a:t>
+              <a:t>9</a:t>
             </a:fld>
             <a:endParaRPr lang="en-US"/>
           </a:p>
@@ -2210,7 +2212,7 @@
           <a:p>
             <a:fld id="{377144E2-9EBE-4751-96F2-3D75627916BE}" type="slidenum">
               <a:rPr lang="en-US" smtClean="0"/>
-              <a:t>9</a:t>
+              <a:t>10</a:t>
             </a:fld>
             <a:endParaRPr lang="en-US"/>
           </a:p>
@@ -2310,7 +2312,7 @@
           <a:p>
             <a:fld id="{377144E2-9EBE-4751-96F2-3D75627916BE}" type="slidenum">
               <a:rPr lang="en-US" smtClean="0"/>
-              <a:t>10</a:t>
+              <a:t>11</a:t>
             </a:fld>
             <a:endParaRPr lang="en-US"/>
           </a:p>
@@ -2398,7 +2400,7 @@
           <a:p>
             <a:fld id="{377144E2-9EBE-4751-96F2-3D75627916BE}" type="slidenum">
               <a:rPr lang="en-US" smtClean="0"/>
-              <a:t>11</a:t>
+              <a:t>12</a:t>
             </a:fld>
             <a:endParaRPr lang="en-US"/>
           </a:p>
@@ -2603,7 +2605,7 @@
           <a:p>
             <a:fld id="{48A87A34-81AB-432B-8DAE-1953F412C126}" type="datetimeFigureOut">
               <a:rPr lang="en-US" smtClean="0"/>
-              <a:t>4/4/2016</a:t>
+              <a:t>4/6/2016</a:t>
             </a:fld>
             <a:endParaRPr lang="en-US" dirty="0"/>
           </a:p>
@@ -2878,7 +2880,7 @@
           <a:p>
             <a:fld id="{48A87A34-81AB-432B-8DAE-1953F412C126}" type="datetimeFigureOut">
               <a:rPr lang="en-US" smtClean="0"/>
-              <a:t>4/4/2016</a:t>
+              <a:t>4/6/2016</a:t>
             </a:fld>
             <a:endParaRPr lang="en-US" dirty="0"/>
           </a:p>
@@ -3072,7 +3074,7 @@
           <a:p>
             <a:fld id="{48A87A34-81AB-432B-8DAE-1953F412C126}" type="datetimeFigureOut">
               <a:rPr lang="en-US" smtClean="0"/>
-              <a:t>4/4/2016</a:t>
+              <a:t>4/6/2016</a:t>
             </a:fld>
             <a:endParaRPr lang="en-US" dirty="0"/>
           </a:p>
@@ -3345,7 +3347,7 @@
           <a:p>
             <a:fld id="{48A87A34-81AB-432B-8DAE-1953F412C126}" type="datetimeFigureOut">
               <a:rPr lang="en-US" smtClean="0"/>
-              <a:t>4/4/2016</a:t>
+              <a:t>4/6/2016</a:t>
             </a:fld>
             <a:endParaRPr lang="en-US" dirty="0"/>
           </a:p>
@@ -3686,7 +3688,7 @@
           <a:p>
             <a:fld id="{48A87A34-81AB-432B-8DAE-1953F412C126}" type="datetimeFigureOut">
               <a:rPr lang="en-US" smtClean="0"/>
-              <a:t>4/4/2016</a:t>
+              <a:t>4/6/2016</a:t>
             </a:fld>
             <a:endParaRPr lang="en-US" dirty="0"/>
           </a:p>
@@ -4309,7 +4311,7 @@
           <a:p>
             <a:fld id="{48A87A34-81AB-432B-8DAE-1953F412C126}" type="datetimeFigureOut">
               <a:rPr lang="en-US" smtClean="0"/>
-              <a:t>4/4/2016</a:t>
+              <a:t>4/6/2016</a:t>
             </a:fld>
             <a:endParaRPr lang="en-US" dirty="0"/>
           </a:p>
@@ -5169,7 +5171,7 @@
           <a:p>
             <a:fld id="{48A87A34-81AB-432B-8DAE-1953F412C126}" type="datetimeFigureOut">
               <a:rPr lang="en-US" smtClean="0"/>
-              <a:t>4/4/2016</a:t>
+              <a:t>4/6/2016</a:t>
             </a:fld>
             <a:endParaRPr lang="en-US" dirty="0"/>
           </a:p>
@@ -5339,7 +5341,7 @@
           <a:p>
             <a:fld id="{48A87A34-81AB-432B-8DAE-1953F412C126}" type="datetimeFigureOut">
               <a:rPr lang="en-US" smtClean="0"/>
-              <a:t>4/4/2016</a:t>
+              <a:t>4/6/2016</a:t>
             </a:fld>
             <a:endParaRPr lang="en-US" dirty="0"/>
           </a:p>
@@ -5519,7 +5521,7 @@
           <a:p>
             <a:fld id="{48A87A34-81AB-432B-8DAE-1953F412C126}" type="datetimeFigureOut">
               <a:rPr lang="en-US" smtClean="0"/>
-              <a:t>4/4/2016</a:t>
+              <a:t>4/6/2016</a:t>
             </a:fld>
             <a:endParaRPr lang="en-US" dirty="0"/>
           </a:p>
@@ -5689,7 +5691,7 @@
           <a:p>
             <a:fld id="{48A87A34-81AB-432B-8DAE-1953F412C126}" type="datetimeFigureOut">
               <a:rPr lang="en-US" smtClean="0"/>
-              <a:t>4/4/2016</a:t>
+              <a:t>4/6/2016</a:t>
             </a:fld>
             <a:endParaRPr lang="en-US" dirty="0"/>
           </a:p>
@@ -5936,7 +5938,7 @@
           <a:p>
             <a:fld id="{48A87A34-81AB-432B-8DAE-1953F412C126}" type="datetimeFigureOut">
               <a:rPr lang="en-US" smtClean="0"/>
-              <a:t>4/4/2016</a:t>
+              <a:t>4/6/2016</a:t>
             </a:fld>
             <a:endParaRPr lang="en-US" dirty="0"/>
           </a:p>
@@ -6228,7 +6230,7 @@
           <a:p>
             <a:fld id="{48A87A34-81AB-432B-8DAE-1953F412C126}" type="datetimeFigureOut">
               <a:rPr lang="en-US" smtClean="0"/>
-              <a:t>4/4/2016</a:t>
+              <a:t>4/6/2016</a:t>
             </a:fld>
             <a:endParaRPr lang="en-US" dirty="0"/>
           </a:p>
@@ -6672,7 +6674,7 @@
           <a:p>
             <a:fld id="{48A87A34-81AB-432B-8DAE-1953F412C126}" type="datetimeFigureOut">
               <a:rPr lang="en-US" smtClean="0"/>
-              <a:t>4/4/2016</a:t>
+              <a:t>4/6/2016</a:t>
             </a:fld>
             <a:endParaRPr lang="en-US" dirty="0"/>
           </a:p>
@@ -6790,7 +6792,7 @@
           <a:p>
             <a:fld id="{48A87A34-81AB-432B-8DAE-1953F412C126}" type="datetimeFigureOut">
               <a:rPr lang="en-US" smtClean="0"/>
-              <a:t>4/4/2016</a:t>
+              <a:t>4/6/2016</a:t>
             </a:fld>
             <a:endParaRPr lang="en-US" dirty="0"/>
           </a:p>
@@ -6885,7 +6887,7 @@
           <a:p>
             <a:fld id="{48A87A34-81AB-432B-8DAE-1953F412C126}" type="datetimeFigureOut">
               <a:rPr lang="en-US" smtClean="0"/>
-              <a:t>4/4/2016</a:t>
+              <a:t>4/6/2016</a:t>
             </a:fld>
             <a:endParaRPr lang="en-US" dirty="0"/>
           </a:p>
@@ -7164,7 +7166,7 @@
           <a:p>
             <a:fld id="{48A87A34-81AB-432B-8DAE-1953F412C126}" type="datetimeFigureOut">
               <a:rPr lang="en-US" smtClean="0"/>
-              <a:t>4/4/2016</a:t>
+              <a:t>4/6/2016</a:t>
             </a:fld>
             <a:endParaRPr lang="en-US" dirty="0"/>
           </a:p>
@@ -7439,7 +7441,7 @@
           <a:p>
             <a:fld id="{48A87A34-81AB-432B-8DAE-1953F412C126}" type="datetimeFigureOut">
               <a:rPr lang="en-US" smtClean="0"/>
-              <a:t>4/4/2016</a:t>
+              <a:t>4/6/2016</a:t>
             </a:fld>
             <a:endParaRPr lang="en-US" dirty="0"/>
           </a:p>
@@ -7869,7 +7871,7 @@
             <a:fld id="{48A87A34-81AB-432B-8DAE-1953F412C126}" type="datetimeFigureOut">
               <a:rPr lang="en-US" smtClean="0"/>
               <a:pPr/>
-              <a:t>4/4/2016</a:t>
+              <a:t>4/6/2016</a:t>
             </a:fld>
             <a:endParaRPr lang="en-US" dirty="0"/>
           </a:p>
@@ -8536,6 +8538,155 @@
           <a:chExt cx="0" cy="0"/>
         </a:xfrm>
       </p:grpSpPr>
+      <p:sp>
+        <p:nvSpPr>
+          <p:cNvPr id="10" name="Title 1"/>
+          <p:cNvSpPr>
+            <a:spLocks noGrp="1"/>
+          </p:cNvSpPr>
+          <p:nvPr>
+            <p:ph type="title"/>
+          </p:nvPr>
+        </p:nvSpPr>
+        <p:spPr>
+          <a:xfrm>
+            <a:off x="1586485" y="308126"/>
+            <a:ext cx="8563984" cy="1478570"/>
+          </a:xfrm>
+        </p:spPr>
+        <p:txBody>
+          <a:bodyPr>
+            <a:normAutofit/>
+          </a:bodyPr>
+          <a:lstStyle/>
+          <a:p>
+            <a:r>
+              <a:rPr lang="en-US" sz="7200" dirty="0" smtClean="0"/>
+              <a:t>What is ROP?</a:t>
+            </a:r>
+            <a:endParaRPr lang="en-US" sz="7200" dirty="0"/>
+          </a:p>
+        </p:txBody>
+      </p:sp>
+      <p:sp>
+        <p:nvSpPr>
+          <p:cNvPr id="3" name="TextBox 2"/>
+          <p:cNvSpPr txBox="1"/>
+          <p:nvPr/>
+        </p:nvSpPr>
+        <p:spPr>
+          <a:xfrm>
+            <a:off x="1330036" y="2535382"/>
+            <a:ext cx="7460673" cy="3539430"/>
+          </a:xfrm>
+          <a:prstGeom prst="rect">
+            <a:avLst/>
+          </a:prstGeom>
+          <a:noFill/>
+        </p:spPr>
+        <p:txBody>
+          <a:bodyPr wrap="square" rtlCol="0">
+            <a:spAutoFit/>
+          </a:bodyPr>
+          <a:lstStyle/>
+          <a:p>
+            <a:r>
+              <a:rPr lang="en-US" sz="3200" dirty="0" smtClean="0"/>
+              <a:t>Programming style to handle errors in a type safe way.  </a:t>
+            </a:r>
+          </a:p>
+          <a:p>
+            <a:endParaRPr lang="en-US" sz="3200" dirty="0"/>
+          </a:p>
+          <a:p>
+            <a:pPr marL="285750" indent="-285750">
+              <a:buFont typeface="Arial" panose="020B0604020202020204" pitchFamily="34" charset="0"/>
+              <a:buChar char="•"/>
+            </a:pPr>
+            <a:r>
+              <a:rPr lang="en-US" sz="3200" dirty="0"/>
+              <a:t>All of this stolen from Scott W</a:t>
+            </a:r>
+            <a:r>
+              <a:rPr lang="en-US" sz="3200" dirty="0" smtClean="0"/>
+              <a:t>.</a:t>
+            </a:r>
+          </a:p>
+          <a:p>
+            <a:pPr marL="285750" indent="-285750">
+              <a:buFont typeface="Arial" panose="020B0604020202020204" pitchFamily="34" charset="0"/>
+              <a:buChar char="•"/>
+            </a:pPr>
+            <a:r>
+              <a:rPr lang="en-US" sz="3200" dirty="0" smtClean="0"/>
+              <a:t>He has 2 videos and several blog posts</a:t>
+            </a:r>
+            <a:endParaRPr lang="en-US" sz="3200" dirty="0"/>
+          </a:p>
+          <a:p>
+            <a:pPr marL="285750" indent="-285750">
+              <a:buFont typeface="Arial" panose="020B0604020202020204" pitchFamily="34" charset="0"/>
+              <a:buChar char="•"/>
+            </a:pPr>
+            <a:r>
+              <a:rPr lang="en-US" sz="3200" dirty="0" smtClean="0">
+                <a:hlinkClick r:id="rId3"/>
+              </a:rPr>
+              <a:t>http</a:t>
+            </a:r>
+            <a:r>
+              <a:rPr lang="en-US" sz="3200" dirty="0">
+                <a:hlinkClick r:id="rId3"/>
+              </a:rPr>
+              <a:t>://fsharpforfunandprofit.com</a:t>
+            </a:r>
+            <a:r>
+              <a:rPr lang="en-US" sz="3200" dirty="0" smtClean="0">
+                <a:hlinkClick r:id="rId3"/>
+              </a:rPr>
+              <a:t>/</a:t>
+            </a:r>
+            <a:endParaRPr lang="en-US" sz="3200" dirty="0" smtClean="0"/>
+          </a:p>
+        </p:txBody>
+      </p:sp>
+    </p:spTree>
+    <p:extLst>
+      <p:ext uri="{BB962C8B-B14F-4D97-AF65-F5344CB8AC3E}">
+        <p14:creationId xmlns:p14="http://schemas.microsoft.com/office/powerpoint/2010/main" val="3247463652"/>
+      </p:ext>
+    </p:extLst>
+  </p:cSld>
+  <p:clrMapOvr>
+    <a:masterClrMapping/>
+  </p:clrMapOvr>
+  <p:timing>
+    <p:tnLst>
+      <p:par>
+        <p:cTn id="1" dur="indefinite" restart="never" nodeType="tmRoot"/>
+      </p:par>
+    </p:tnLst>
+  </p:timing>
+</p:sld>
+</file>
+
+<file path=ppt/slides/slide11.xml><?xml version="1.0" encoding="utf-8"?>
+<p:sld xmlns:a="http://schemas.openxmlformats.org/drawingml/2006/main" xmlns:r="http://schemas.openxmlformats.org/officeDocument/2006/relationships" xmlns:p="http://schemas.openxmlformats.org/presentationml/2006/main">
+  <p:cSld>
+    <p:spTree>
+      <p:nvGrpSpPr>
+        <p:cNvPr id="1" name=""/>
+        <p:cNvGrpSpPr/>
+        <p:nvPr/>
+      </p:nvGrpSpPr>
+      <p:grpSpPr>
+        <a:xfrm>
+          <a:off x="0" y="0"/>
+          <a:ext cx="0" cy="0"/>
+          <a:chOff x="0" y="0"/>
+          <a:chExt cx="0" cy="0"/>
+        </a:xfrm>
+      </p:grpSpPr>
       <p:pic>
         <p:nvPicPr>
           <p:cNvPr id="1026" name="Picture 2" descr="A imperative data flow"/>
@@ -8740,7 +8891,7 @@
 </p:sld>
 </file>
 
-<file path=ppt/slides/slide11.xml><?xml version="1.0" encoding="utf-8"?>
+<file path=ppt/slides/slide12.xml><?xml version="1.0" encoding="utf-8"?>
 <p:sld xmlns:a="http://schemas.openxmlformats.org/drawingml/2006/main" xmlns:r="http://schemas.openxmlformats.org/officeDocument/2006/relationships" xmlns:p="http://schemas.openxmlformats.org/presentationml/2006/main">
   <p:cSld>
     <p:spTree>
@@ -8872,7 +9023,7 @@
 </p:sld>
 </file>
 
-<file path=ppt/slides/slide12.xml><?xml version="1.0" encoding="utf-8"?>
+<file path=ppt/slides/slide13.xml><?xml version="1.0" encoding="utf-8"?>
 <p:sld xmlns:a="http://schemas.openxmlformats.org/drawingml/2006/main" xmlns:r="http://schemas.openxmlformats.org/officeDocument/2006/relationships" xmlns:p="http://schemas.openxmlformats.org/presentationml/2006/main">
   <p:cSld>
     <p:spTree>
@@ -8959,7 +9110,7 @@
 </p:sld>
 </file>
 
-<file path=ppt/slides/slide13.xml><?xml version="1.0" encoding="utf-8"?>
+<file path=ppt/slides/slide14.xml><?xml version="1.0" encoding="utf-8"?>
 <p:sld xmlns:a="http://schemas.openxmlformats.org/drawingml/2006/main" xmlns:r="http://schemas.openxmlformats.org/officeDocument/2006/relationships" xmlns:p="http://schemas.openxmlformats.org/presentationml/2006/main">
   <p:cSld>
     <p:spTree>
@@ -9214,7 +9365,7 @@
 </p:sld>
 </file>
 
-<file path=ppt/slides/slide14.xml><?xml version="1.0" encoding="utf-8"?>
+<file path=ppt/slides/slide15.xml><?xml version="1.0" encoding="utf-8"?>
 <p:sld xmlns:a="http://schemas.openxmlformats.org/drawingml/2006/main" xmlns:r="http://schemas.openxmlformats.org/officeDocument/2006/relationships" xmlns:p="http://schemas.openxmlformats.org/presentationml/2006/main">
   <p:cSld>
     <p:spTree>
@@ -9338,7 +9489,7 @@
 </p:sld>
 </file>
 
-<file path=ppt/slides/slide15.xml><?xml version="1.0" encoding="utf-8"?>
+<file path=ppt/slides/slide16.xml><?xml version="1.0" encoding="utf-8"?>
 <p:sld xmlns:a="http://schemas.openxmlformats.org/drawingml/2006/main" xmlns:r="http://schemas.openxmlformats.org/officeDocument/2006/relationships" xmlns:p="http://schemas.openxmlformats.org/presentationml/2006/main">
   <p:cSld>
     <p:spTree>
@@ -9480,7 +9631,7 @@
 </p:sld>
 </file>
 
-<file path=ppt/slides/slide16.xml><?xml version="1.0" encoding="utf-8"?>
+<file path=ppt/slides/slide17.xml><?xml version="1.0" encoding="utf-8"?>
 <p:sld xmlns:a="http://schemas.openxmlformats.org/drawingml/2006/main" xmlns:r="http://schemas.openxmlformats.org/officeDocument/2006/relationships" xmlns:p="http://schemas.openxmlformats.org/presentationml/2006/main">
   <p:cSld>
     <p:spTree>
@@ -9604,7 +9755,7 @@
 </p:sld>
 </file>
 
-<file path=ppt/slides/slide17.xml><?xml version="1.0" encoding="utf-8"?>
+<file path=ppt/slides/slide18.xml><?xml version="1.0" encoding="utf-8"?>
 <p:sld xmlns:a="http://schemas.openxmlformats.org/drawingml/2006/main" xmlns:r="http://schemas.openxmlformats.org/officeDocument/2006/relationships" xmlns:p="http://schemas.openxmlformats.org/presentationml/2006/main">
   <p:cSld>
     <p:spTree>
@@ -9787,91 +9938,6 @@
 </p:sld>
 </file>
 
-<file path=ppt/slides/slide18.xml><?xml version="1.0" encoding="utf-8"?>
-<p:sld xmlns:a="http://schemas.openxmlformats.org/drawingml/2006/main" xmlns:r="http://schemas.openxmlformats.org/officeDocument/2006/relationships" xmlns:p="http://schemas.openxmlformats.org/presentationml/2006/main">
-  <p:cSld>
-    <p:spTree>
-      <p:nvGrpSpPr>
-        <p:cNvPr id="1" name=""/>
-        <p:cNvGrpSpPr/>
-        <p:nvPr/>
-      </p:nvGrpSpPr>
-      <p:grpSpPr>
-        <a:xfrm>
-          <a:off x="0" y="0"/>
-          <a:ext cx="0" cy="0"/>
-          <a:chOff x="0" y="0"/>
-          <a:chExt cx="0" cy="0"/>
-        </a:xfrm>
-      </p:grpSpPr>
-      <p:sp>
-        <p:nvSpPr>
-          <p:cNvPr id="4" name="Title 3"/>
-          <p:cNvSpPr>
-            <a:spLocks noGrp="1"/>
-          </p:cNvSpPr>
-          <p:nvPr>
-            <p:ph type="ctrTitle"/>
-          </p:nvPr>
-        </p:nvSpPr>
-        <p:spPr/>
-        <p:txBody>
-          <a:bodyPr/>
-          <a:lstStyle/>
-          <a:p>
-            <a:r>
-              <a:rPr lang="en-US" dirty="0" smtClean="0"/>
-              <a:t>Lets play around</a:t>
-            </a:r>
-            <a:endParaRPr lang="en-US" dirty="0"/>
-          </a:p>
-        </p:txBody>
-      </p:sp>
-      <p:sp>
-        <p:nvSpPr>
-          <p:cNvPr id="5" name="Subtitle 4"/>
-          <p:cNvSpPr>
-            <a:spLocks noGrp="1"/>
-          </p:cNvSpPr>
-          <p:nvPr>
-            <p:ph type="subTitle" idx="1"/>
-          </p:nvPr>
-        </p:nvSpPr>
-        <p:spPr/>
-        <p:txBody>
-          <a:bodyPr>
-            <a:normAutofit/>
-          </a:bodyPr>
-          <a:lstStyle/>
-          <a:p>
-            <a:r>
-              <a:rPr lang="en-US" sz="3600" dirty="0" smtClean="0"/>
-              <a:t>First Code sample</a:t>
-            </a:r>
-            <a:endParaRPr lang="en-US" sz="3600" dirty="0"/>
-          </a:p>
-        </p:txBody>
-      </p:sp>
-    </p:spTree>
-    <p:extLst>
-      <p:ext uri="{BB962C8B-B14F-4D97-AF65-F5344CB8AC3E}">
-        <p14:creationId xmlns:p14="http://schemas.microsoft.com/office/powerpoint/2010/main" val="554892091"/>
-      </p:ext>
-    </p:extLst>
-  </p:cSld>
-  <p:clrMapOvr>
-    <a:masterClrMapping/>
-  </p:clrMapOvr>
-  <p:timing>
-    <p:tnLst>
-      <p:par>
-        <p:cTn id="1" dur="indefinite" restart="never" nodeType="tmRoot"/>
-      </p:par>
-    </p:tnLst>
-  </p:timing>
-</p:sld>
-</file>
-
 <file path=ppt/slides/slide19.xml><?xml version="1.0" encoding="utf-8"?>
 <p:sld xmlns:a="http://schemas.openxmlformats.org/drawingml/2006/main" xmlns:r="http://schemas.openxmlformats.org/officeDocument/2006/relationships" xmlns:p="http://schemas.openxmlformats.org/presentationml/2006/main">
   <p:cSld>
@@ -9891,102 +9957,56 @@
       </p:grpSpPr>
       <p:sp>
         <p:nvSpPr>
-          <p:cNvPr id="2" name="Title 1"/>
-          <p:cNvSpPr>
-            <a:spLocks noGrp="1"/>
-          </p:cNvSpPr>
-          <p:nvPr>
-            <p:ph type="title"/>
-          </p:nvPr>
-        </p:nvSpPr>
-        <p:spPr>
-          <a:xfrm>
-            <a:off x="651043" y="3409261"/>
-            <a:ext cx="10849696" cy="1478570"/>
-          </a:xfrm>
-        </p:spPr>
+          <p:cNvPr id="4" name="Title 3"/>
+          <p:cNvSpPr>
+            <a:spLocks noGrp="1"/>
+          </p:cNvSpPr>
+          <p:nvPr>
+            <p:ph type="ctrTitle"/>
+          </p:nvPr>
+        </p:nvSpPr>
+        <p:spPr/>
         <p:txBody>
           <a:bodyPr/>
           <a:lstStyle/>
           <a:p>
-            <a:pPr algn="ctr"/>
-            <a:r>
-              <a:rPr lang="en-US" sz="4800" dirty="0" smtClean="0"/>
-              <a:t>You now know 80% of ROP and 2% of Monads</a:t>
-            </a:r>
-            <a:br>
-              <a:rPr lang="en-US" sz="4800" dirty="0" smtClean="0"/>
-            </a:br>
-            <a:r>
-              <a:rPr lang="en-US" sz="4800" dirty="0"/>
-              <a:t>Lets make this more Robust</a:t>
-            </a:r>
-          </a:p>
-        </p:txBody>
-      </p:sp>
-      <p:sp>
-        <p:nvSpPr>
-          <p:cNvPr id="4" name="Rectangle 3"/>
-          <p:cNvSpPr/>
-          <p:nvPr/>
-        </p:nvSpPr>
-        <p:spPr>
-          <a:xfrm rot="21157551">
-            <a:off x="112159" y="1138956"/>
-            <a:ext cx="10929936" cy="1569660"/>
-          </a:xfrm>
-          <a:prstGeom prst="rect">
-            <a:avLst/>
-          </a:prstGeom>
-          <a:noFill/>
-        </p:spPr>
-        <p:txBody>
-          <a:bodyPr wrap="square" lIns="91440" tIns="45720" rIns="91440" bIns="45720">
-            <a:spAutoFit/>
+            <a:r>
+              <a:rPr lang="en-US" dirty="0" smtClean="0"/>
+              <a:t>Lets play around</a:t>
+            </a:r>
+            <a:endParaRPr lang="en-US" dirty="0"/>
+          </a:p>
+        </p:txBody>
+      </p:sp>
+      <p:sp>
+        <p:nvSpPr>
+          <p:cNvPr id="5" name="Subtitle 4"/>
+          <p:cNvSpPr>
+            <a:spLocks noGrp="1"/>
+          </p:cNvSpPr>
+          <p:nvPr>
+            <p:ph type="subTitle" idx="1"/>
+          </p:nvPr>
+        </p:nvSpPr>
+        <p:spPr/>
+        <p:txBody>
+          <a:bodyPr>
+            <a:normAutofit/>
           </a:bodyPr>
           <a:lstStyle/>
           <a:p>
-            <a:pPr algn="ctr"/>
-            <a:r>
-              <a:rPr lang="en-US" sz="9600" b="1" cap="none" spc="0" dirty="0" smtClean="0">
-                <a:ln w="22225">
-                  <a:solidFill>
-                    <a:schemeClr val="accent2"/>
-                  </a:solidFill>
-                  <a:prstDash val="solid"/>
-                </a:ln>
-                <a:solidFill>
-                  <a:schemeClr val="accent2">
-                    <a:lumMod val="40000"/>
-                    <a:lumOff val="60000"/>
-                  </a:schemeClr>
-                </a:solidFill>
-                <a:effectLst/>
-              </a:rPr>
-              <a:t>Congratulations!!!</a:t>
-            </a:r>
-            <a:endParaRPr lang="en-US" sz="9600" b="1" cap="none" spc="0" dirty="0">
-              <a:ln w="22225">
-                <a:solidFill>
-                  <a:schemeClr val="accent2"/>
-                </a:solidFill>
-                <a:prstDash val="solid"/>
-              </a:ln>
-              <a:solidFill>
-                <a:schemeClr val="accent2">
-                  <a:lumMod val="40000"/>
-                  <a:lumOff val="60000"/>
-                </a:schemeClr>
-              </a:solidFill>
-              <a:effectLst/>
-            </a:endParaRPr>
+            <a:r>
+              <a:rPr lang="en-US" sz="3600" dirty="0" smtClean="0"/>
+              <a:t>First Code sample</a:t>
+            </a:r>
+            <a:endParaRPr lang="en-US" sz="3600" dirty="0"/>
           </a:p>
         </p:txBody>
       </p:sp>
     </p:spTree>
     <p:extLst>
       <p:ext uri="{BB962C8B-B14F-4D97-AF65-F5344CB8AC3E}">
-        <p14:creationId xmlns:p14="http://schemas.microsoft.com/office/powerpoint/2010/main" val="1231585588"/>
+        <p14:creationId xmlns:p14="http://schemas.microsoft.com/office/powerpoint/2010/main" val="554892091"/>
       </p:ext>
     </p:extLst>
   </p:cSld>
@@ -10107,6 +10127,137 @@
 </file>
 
 <file path=ppt/slides/slide20.xml><?xml version="1.0" encoding="utf-8"?>
+<p:sld xmlns:a="http://schemas.openxmlformats.org/drawingml/2006/main" xmlns:r="http://schemas.openxmlformats.org/officeDocument/2006/relationships" xmlns:p="http://schemas.openxmlformats.org/presentationml/2006/main">
+  <p:cSld>
+    <p:spTree>
+      <p:nvGrpSpPr>
+        <p:cNvPr id="1" name=""/>
+        <p:cNvGrpSpPr/>
+        <p:nvPr/>
+      </p:nvGrpSpPr>
+      <p:grpSpPr>
+        <a:xfrm>
+          <a:off x="0" y="0"/>
+          <a:ext cx="0" cy="0"/>
+          <a:chOff x="0" y="0"/>
+          <a:chExt cx="0" cy="0"/>
+        </a:xfrm>
+      </p:grpSpPr>
+      <p:sp>
+        <p:nvSpPr>
+          <p:cNvPr id="2" name="Title 1"/>
+          <p:cNvSpPr>
+            <a:spLocks noGrp="1"/>
+          </p:cNvSpPr>
+          <p:nvPr>
+            <p:ph type="title"/>
+          </p:nvPr>
+        </p:nvSpPr>
+        <p:spPr>
+          <a:xfrm>
+            <a:off x="651043" y="3409261"/>
+            <a:ext cx="10849696" cy="1478570"/>
+          </a:xfrm>
+        </p:spPr>
+        <p:txBody>
+          <a:bodyPr/>
+          <a:lstStyle/>
+          <a:p>
+            <a:pPr algn="ctr"/>
+            <a:r>
+              <a:rPr lang="en-US" sz="4800" dirty="0" smtClean="0"/>
+              <a:t>You now know 80% of ROP and 2% of Monads</a:t>
+            </a:r>
+            <a:br>
+              <a:rPr lang="en-US" sz="4800" dirty="0" smtClean="0"/>
+            </a:br>
+            <a:r>
+              <a:rPr lang="en-US" sz="4800" dirty="0"/>
+              <a:t>Lets make this more Robust</a:t>
+            </a:r>
+          </a:p>
+        </p:txBody>
+      </p:sp>
+      <p:sp>
+        <p:nvSpPr>
+          <p:cNvPr id="4" name="Rectangle 3"/>
+          <p:cNvSpPr/>
+          <p:nvPr/>
+        </p:nvSpPr>
+        <p:spPr>
+          <a:xfrm rot="21157551">
+            <a:off x="112159" y="1138956"/>
+            <a:ext cx="10929936" cy="1569660"/>
+          </a:xfrm>
+          <a:prstGeom prst="rect">
+            <a:avLst/>
+          </a:prstGeom>
+          <a:noFill/>
+        </p:spPr>
+        <p:txBody>
+          <a:bodyPr wrap="square" lIns="91440" tIns="45720" rIns="91440" bIns="45720">
+            <a:spAutoFit/>
+          </a:bodyPr>
+          <a:lstStyle/>
+          <a:p>
+            <a:pPr algn="ctr"/>
+            <a:r>
+              <a:rPr lang="en-US" sz="9600" b="1" cap="none" spc="0" dirty="0" smtClean="0">
+                <a:ln w="22225">
+                  <a:solidFill>
+                    <a:schemeClr val="accent2"/>
+                  </a:solidFill>
+                  <a:prstDash val="solid"/>
+                </a:ln>
+                <a:solidFill>
+                  <a:schemeClr val="accent2">
+                    <a:lumMod val="40000"/>
+                    <a:lumOff val="60000"/>
+                  </a:schemeClr>
+                </a:solidFill>
+                <a:effectLst/>
+              </a:rPr>
+              <a:t>Congratulations!!!</a:t>
+            </a:r>
+            <a:endParaRPr lang="en-US" sz="9600" b="1" cap="none" spc="0" dirty="0">
+              <a:ln w="22225">
+                <a:solidFill>
+                  <a:schemeClr val="accent2"/>
+                </a:solidFill>
+                <a:prstDash val="solid"/>
+              </a:ln>
+              <a:solidFill>
+                <a:schemeClr val="accent2">
+                  <a:lumMod val="40000"/>
+                  <a:lumOff val="60000"/>
+                </a:schemeClr>
+              </a:solidFill>
+              <a:effectLst/>
+            </a:endParaRPr>
+          </a:p>
+        </p:txBody>
+      </p:sp>
+    </p:spTree>
+    <p:extLst>
+      <p:ext uri="{BB962C8B-B14F-4D97-AF65-F5344CB8AC3E}">
+        <p14:creationId xmlns:p14="http://schemas.microsoft.com/office/powerpoint/2010/main" val="1231585588"/>
+      </p:ext>
+    </p:extLst>
+  </p:cSld>
+  <p:clrMapOvr>
+    <a:masterClrMapping/>
+  </p:clrMapOvr>
+  <p:timing>
+    <p:tnLst>
+      <p:par>
+        <p:cTn id="1" dur="indefinite" restart="never" nodeType="tmRoot"/>
+      </p:par>
+    </p:tnLst>
+  </p:timing>
+</p:sld>
+</file>
+
+<file path=ppt/slides/slide21.xml><?xml version="1.0" encoding="utf-8"?>
 <p:sld xmlns:a="http://schemas.openxmlformats.org/drawingml/2006/main" xmlns:r="http://schemas.openxmlformats.org/officeDocument/2006/relationships" xmlns:p="http://schemas.openxmlformats.org/presentationml/2006/main">
   <p:cSld>
     <p:spTree>
@@ -10230,7 +10381,7 @@
 </p:sld>
 </file>
 
-<file path=ppt/slides/slide21.xml><?xml version="1.0" encoding="utf-8"?>
+<file path=ppt/slides/slide22.xml><?xml version="1.0" encoding="utf-8"?>
 <p:sld xmlns:a="http://schemas.openxmlformats.org/drawingml/2006/main" xmlns:r="http://schemas.openxmlformats.org/officeDocument/2006/relationships" xmlns:p="http://schemas.openxmlformats.org/presentationml/2006/main">
   <p:cSld>
     <p:spTree>
@@ -10362,7 +10513,7 @@
 </p:sld>
 </file>
 
-<file path=ppt/slides/slide22.xml><?xml version="1.0" encoding="utf-8"?>
+<file path=ppt/slides/slide23.xml><?xml version="1.0" encoding="utf-8"?>
 <p:sld xmlns:a="http://schemas.openxmlformats.org/drawingml/2006/main" xmlns:r="http://schemas.openxmlformats.org/officeDocument/2006/relationships" xmlns:p="http://schemas.openxmlformats.org/presentationml/2006/main">
   <p:cSld>
     <p:spTree>
@@ -10450,7 +10601,7 @@
 </p:sld>
 </file>
 
-<file path=ppt/slides/slide23.xml><?xml version="1.0" encoding="utf-8"?>
+<file path=ppt/slides/slide24.xml><?xml version="1.0" encoding="utf-8"?>
 <p:sld xmlns:a="http://schemas.openxmlformats.org/drawingml/2006/main" xmlns:r="http://schemas.openxmlformats.org/officeDocument/2006/relationships" xmlns:p="http://schemas.openxmlformats.org/presentationml/2006/main">
   <p:cSld>
     <p:spTree>
@@ -10535,7 +10686,7 @@
 </p:sld>
 </file>
 
-<file path=ppt/slides/slide24.xml><?xml version="1.0" encoding="utf-8"?>
+<file path=ppt/slides/slide25.xml><?xml version="1.0" encoding="utf-8"?>
 <p:sld xmlns:a="http://schemas.openxmlformats.org/drawingml/2006/main" xmlns:r="http://schemas.openxmlformats.org/officeDocument/2006/relationships" xmlns:p="http://schemas.openxmlformats.org/presentationml/2006/main">
   <p:cSld>
     <p:spTree>
@@ -10636,7 +10787,7 @@
 </p:sld>
 </file>
 
-<file path=ppt/slides/slide25.xml><?xml version="1.0" encoding="utf-8"?>
+<file path=ppt/slides/slide26.xml><?xml version="1.0" encoding="utf-8"?>
 <p:sld xmlns:a="http://schemas.openxmlformats.org/drawingml/2006/main" xmlns:r="http://schemas.openxmlformats.org/officeDocument/2006/relationships" xmlns:p="http://schemas.openxmlformats.org/presentationml/2006/main">
   <p:cSld>
     <p:spTree>
@@ -10744,91 +10895,6 @@
 </p:sld>
 </file>
 
-<file path=ppt/slides/slide26.xml><?xml version="1.0" encoding="utf-8"?>
-<p:sld xmlns:a="http://schemas.openxmlformats.org/drawingml/2006/main" xmlns:r="http://schemas.openxmlformats.org/officeDocument/2006/relationships" xmlns:p="http://schemas.openxmlformats.org/presentationml/2006/main">
-  <p:cSld>
-    <p:spTree>
-      <p:nvGrpSpPr>
-        <p:cNvPr id="1" name=""/>
-        <p:cNvGrpSpPr/>
-        <p:nvPr/>
-      </p:nvGrpSpPr>
-      <p:grpSpPr>
-        <a:xfrm>
-          <a:off x="0" y="0"/>
-          <a:ext cx="0" cy="0"/>
-          <a:chOff x="0" y="0"/>
-          <a:chExt cx="0" cy="0"/>
-        </a:xfrm>
-      </p:grpSpPr>
-      <p:sp>
-        <p:nvSpPr>
-          <p:cNvPr id="4" name="Title 3"/>
-          <p:cNvSpPr>
-            <a:spLocks noGrp="1"/>
-          </p:cNvSpPr>
-          <p:nvPr>
-            <p:ph type="ctrTitle"/>
-          </p:nvPr>
-        </p:nvSpPr>
-        <p:spPr/>
-        <p:txBody>
-          <a:bodyPr/>
-          <a:lstStyle/>
-          <a:p>
-            <a:r>
-              <a:rPr lang="en-US" dirty="0" smtClean="0"/>
-              <a:t>Lets play around</a:t>
-            </a:r>
-            <a:endParaRPr lang="en-US" dirty="0"/>
-          </a:p>
-        </p:txBody>
-      </p:sp>
-      <p:sp>
-        <p:nvSpPr>
-          <p:cNvPr id="5" name="Subtitle 4"/>
-          <p:cNvSpPr>
-            <a:spLocks noGrp="1"/>
-          </p:cNvSpPr>
-          <p:nvPr>
-            <p:ph type="subTitle" idx="1"/>
-          </p:nvPr>
-        </p:nvSpPr>
-        <p:spPr/>
-        <p:txBody>
-          <a:bodyPr>
-            <a:normAutofit/>
-          </a:bodyPr>
-          <a:lstStyle/>
-          <a:p>
-            <a:r>
-              <a:rPr lang="en-US" sz="3600" dirty="0" smtClean="0"/>
-              <a:t>Third Code sample</a:t>
-            </a:r>
-            <a:endParaRPr lang="en-US" sz="3600" dirty="0"/>
-          </a:p>
-        </p:txBody>
-      </p:sp>
-    </p:spTree>
-    <p:extLst>
-      <p:ext uri="{BB962C8B-B14F-4D97-AF65-F5344CB8AC3E}">
-        <p14:creationId xmlns:p14="http://schemas.microsoft.com/office/powerpoint/2010/main" val="3681266185"/>
-      </p:ext>
-    </p:extLst>
-  </p:cSld>
-  <p:clrMapOvr>
-    <a:masterClrMapping/>
-  </p:clrMapOvr>
-  <p:timing>
-    <p:tnLst>
-      <p:par>
-        <p:cTn id="1" dur="indefinite" restart="never" nodeType="tmRoot"/>
-      </p:par>
-    </p:tnLst>
-  </p:timing>
-</p:sld>
-</file>
-
 <file path=ppt/slides/slide27.xml><?xml version="1.0" encoding="utf-8"?>
 <p:sld xmlns:a="http://schemas.openxmlformats.org/drawingml/2006/main" xmlns:r="http://schemas.openxmlformats.org/officeDocument/2006/relationships" xmlns:p="http://schemas.openxmlformats.org/presentationml/2006/main">
   <p:cSld>
@@ -10856,19 +10922,14 @@
             <p:ph type="ctrTitle"/>
           </p:nvPr>
         </p:nvSpPr>
-        <p:spPr>
-          <a:xfrm>
-            <a:off x="1154955" y="1447800"/>
-            <a:ext cx="8825658" cy="1129145"/>
-          </a:xfrm>
-        </p:spPr>
+        <p:spPr/>
         <p:txBody>
           <a:bodyPr/>
           <a:lstStyle/>
           <a:p>
             <a:r>
-              <a:rPr lang="en-US" dirty="0" err="1" smtClean="0"/>
-              <a:t>Chessie</a:t>
+              <a:rPr lang="en-US" dirty="0" smtClean="0"/>
+              <a:t>Lets play around</a:t>
             </a:r>
             <a:endParaRPr lang="en-US" dirty="0"/>
           </a:p>
@@ -10884,12 +10945,7 @@
             <p:ph type="subTitle" idx="1"/>
           </p:nvPr>
         </p:nvSpPr>
-        <p:spPr>
-          <a:xfrm>
-            <a:off x="1154955" y="2576945"/>
-            <a:ext cx="8825658" cy="861420"/>
-          </a:xfrm>
-        </p:spPr>
+        <p:spPr/>
         <p:txBody>
           <a:bodyPr>
             <a:normAutofit/>
@@ -10898,65 +10954,16 @@
           <a:p>
             <a:r>
               <a:rPr lang="en-US" sz="3600" dirty="0" smtClean="0"/>
-              <a:t>Tale of 3 Night Clubs</a:t>
+              <a:t>Third Code sample</a:t>
             </a:r>
             <a:endParaRPr lang="en-US" sz="3600" dirty="0"/>
-          </a:p>
-        </p:txBody>
-      </p:sp>
-      <p:sp>
-        <p:nvSpPr>
-          <p:cNvPr id="3" name="TextBox 2"/>
-          <p:cNvSpPr txBox="1"/>
-          <p:nvPr/>
-        </p:nvSpPr>
-        <p:spPr>
-          <a:xfrm>
-            <a:off x="1309255" y="3345873"/>
-            <a:ext cx="6224154" cy="646331"/>
-          </a:xfrm>
-          <a:prstGeom prst="rect">
-            <a:avLst/>
-          </a:prstGeom>
-          <a:noFill/>
-        </p:spPr>
-        <p:txBody>
-          <a:bodyPr wrap="square" rtlCol="0">
-            <a:spAutoFit/>
-          </a:bodyPr>
-          <a:lstStyle/>
-          <a:p>
-            <a:pPr marL="285750" indent="-285750">
-              <a:buFont typeface="Arial" panose="020B0604020202020204" pitchFamily="34" charset="0"/>
-              <a:buChar char="•"/>
-            </a:pPr>
-            <a:r>
-              <a:rPr lang="en-US" dirty="0" smtClean="0">
-                <a:hlinkClick r:id="rId3"/>
-              </a:rPr>
-              <a:t>F#</a:t>
-            </a:r>
-            <a:endParaRPr lang="en-US" dirty="0" smtClean="0"/>
-          </a:p>
-          <a:p>
-            <a:pPr marL="285750" indent="-285750">
-              <a:buFont typeface="Arial" panose="020B0604020202020204" pitchFamily="34" charset="0"/>
-              <a:buChar char="•"/>
-            </a:pPr>
-            <a:r>
-              <a:rPr lang="en-US" dirty="0" smtClean="0">
-                <a:hlinkClick r:id="rId4"/>
-              </a:rPr>
-              <a:t>C#</a:t>
-            </a:r>
-            <a:endParaRPr lang="en-US" dirty="0"/>
           </a:p>
         </p:txBody>
       </p:sp>
     </p:spTree>
     <p:extLst>
       <p:ext uri="{BB962C8B-B14F-4D97-AF65-F5344CB8AC3E}">
-        <p14:creationId xmlns:p14="http://schemas.microsoft.com/office/powerpoint/2010/main" val="3676529787"/>
+        <p14:creationId xmlns:p14="http://schemas.microsoft.com/office/powerpoint/2010/main" val="3681266185"/>
       </p:ext>
     </p:extLst>
   </p:cSld>
@@ -10992,80 +10999,107 @@
       </p:grpSpPr>
       <p:sp>
         <p:nvSpPr>
-          <p:cNvPr id="2" name="Title 1"/>
-          <p:cNvSpPr>
-            <a:spLocks noGrp="1"/>
-          </p:cNvSpPr>
-          <p:nvPr>
-            <p:ph type="title"/>
-          </p:nvPr>
-        </p:nvSpPr>
-        <p:spPr/>
+          <p:cNvPr id="4" name="Title 3"/>
+          <p:cNvSpPr>
+            <a:spLocks noGrp="1"/>
+          </p:cNvSpPr>
+          <p:nvPr>
+            <p:ph type="ctrTitle"/>
+          </p:nvPr>
+        </p:nvSpPr>
+        <p:spPr>
+          <a:xfrm>
+            <a:off x="1154955" y="1447800"/>
+            <a:ext cx="8825658" cy="1129145"/>
+          </a:xfrm>
+        </p:spPr>
         <p:txBody>
           <a:bodyPr/>
           <a:lstStyle/>
           <a:p>
             <a:r>
-              <a:rPr lang="en-US" sz="7200" dirty="0" smtClean="0"/>
-              <a:t>Other Topics</a:t>
-            </a:r>
-            <a:endParaRPr lang="en-US" sz="7200" dirty="0"/>
-          </a:p>
-        </p:txBody>
-      </p:sp>
-      <p:sp>
-        <p:nvSpPr>
-          <p:cNvPr id="3" name="Content Placeholder 2"/>
-          <p:cNvSpPr>
-            <a:spLocks noGrp="1"/>
-          </p:cNvSpPr>
-          <p:nvPr>
-            <p:ph idx="1"/>
-          </p:nvPr>
-        </p:nvSpPr>
-        <p:spPr/>
+              <a:rPr lang="en-US" dirty="0" err="1" smtClean="0"/>
+              <a:t>Chessie</a:t>
+            </a:r>
+            <a:endParaRPr lang="en-US" dirty="0"/>
+          </a:p>
+        </p:txBody>
+      </p:sp>
+      <p:sp>
+        <p:nvSpPr>
+          <p:cNvPr id="5" name="Subtitle 4"/>
+          <p:cNvSpPr>
+            <a:spLocks noGrp="1"/>
+          </p:cNvSpPr>
+          <p:nvPr>
+            <p:ph type="subTitle" idx="1"/>
+          </p:nvPr>
+        </p:nvSpPr>
+        <p:spPr>
+          <a:xfrm>
+            <a:off x="1154955" y="2576945"/>
+            <a:ext cx="8825658" cy="861420"/>
+          </a:xfrm>
+        </p:spPr>
         <p:txBody>
           <a:bodyPr>
-            <a:normAutofit fontScale="85000" lnSpcReduction="10000"/>
+            <a:normAutofit/>
           </a:bodyPr>
           <a:lstStyle/>
           <a:p>
             <a:r>
               <a:rPr lang="en-US" sz="3600" dirty="0" smtClean="0"/>
-              <a:t>Injecting functions into flow based on application inputs/configuration</a:t>
-            </a:r>
-          </a:p>
-          <a:p>
-            <a:r>
-              <a:rPr lang="en-US" sz="3600" dirty="0" smtClean="0"/>
-              <a:t>Adding Warning Messages to your success type</a:t>
-            </a:r>
-          </a:p>
-          <a:p>
-            <a:r>
-              <a:rPr lang="en-US" sz="3600" dirty="0" smtClean="0"/>
-              <a:t>Adding Warning Type: Three track model</a:t>
-            </a:r>
-          </a:p>
-          <a:p>
-            <a:r>
-              <a:rPr lang="en-US" sz="3600" dirty="0" smtClean="0"/>
-              <a:t>Doing this asynchronously </a:t>
-            </a:r>
-          </a:p>
-          <a:p>
-            <a:r>
-              <a:rPr lang="en-US" sz="3600" dirty="0" smtClean="0"/>
-              <a:t>Creating Computation Expression to do this </a:t>
-            </a:r>
-          </a:p>
-          <a:p>
-            <a:r>
-              <a:rPr lang="en-US" sz="3600" dirty="0" smtClean="0"/>
-              <a:t>Read Scott W.’s blog!</a:t>
-            </a:r>
-          </a:p>
-          <a:p>
+              <a:t>Tale of 3 Night Clubs</a:t>
+            </a:r>
+            <a:endParaRPr lang="en-US" sz="3600" dirty="0"/>
+          </a:p>
+        </p:txBody>
+      </p:sp>
+      <p:sp>
+        <p:nvSpPr>
+          <p:cNvPr id="3" name="TextBox 2"/>
+          <p:cNvSpPr txBox="1"/>
+          <p:nvPr/>
+        </p:nvSpPr>
+        <p:spPr>
+          <a:xfrm>
+            <a:off x="1309255" y="3345873"/>
+            <a:ext cx="6224154" cy="646331"/>
+          </a:xfrm>
+          <a:prstGeom prst="rect">
+            <a:avLst/>
+          </a:prstGeom>
+          <a:noFill/>
+        </p:spPr>
+        <p:txBody>
+          <a:bodyPr wrap="square" rtlCol="0">
+            <a:spAutoFit/>
+          </a:bodyPr>
+          <a:lstStyle/>
+          <a:p>
+            <a:pPr marL="285750" indent="-285750">
+              <a:buFont typeface="Arial" panose="020B0604020202020204" pitchFamily="34" charset="0"/>
+              <a:buChar char="•"/>
+            </a:pPr>
+            <a:r>
+              <a:rPr lang="en-US" dirty="0" smtClean="0">
+                <a:hlinkClick r:id="rId3"/>
+              </a:rPr>
+              <a:t>F#</a:t>
+            </a:r>
+            <a:endParaRPr lang="en-US" dirty="0" smtClean="0"/>
+          </a:p>
+          <a:p>
+            <a:pPr marL="285750" indent="-285750">
+              <a:buFont typeface="Arial" panose="020B0604020202020204" pitchFamily="34" charset="0"/>
+              <a:buChar char="•"/>
+            </a:pPr>
+            <a:r>
+              <a:rPr lang="en-US" dirty="0" smtClean="0">
+                <a:hlinkClick r:id="rId4"/>
+              </a:rPr>
+              <a:t>C#</a:t>
+            </a:r>
             <a:endParaRPr lang="en-US" dirty="0"/>
           </a:p>
         </p:txBody>
@@ -11073,7 +11107,7 @@
     </p:spTree>
     <p:extLst>
       <p:ext uri="{BB962C8B-B14F-4D97-AF65-F5344CB8AC3E}">
-        <p14:creationId xmlns:p14="http://schemas.microsoft.com/office/powerpoint/2010/main" val="756987525"/>
+        <p14:creationId xmlns:p14="http://schemas.microsoft.com/office/powerpoint/2010/main" val="3676529787"/>
       </p:ext>
     </p:extLst>
   </p:cSld>
@@ -11124,7 +11158,7 @@
           <a:p>
             <a:r>
               <a:rPr lang="en-US" sz="7200" dirty="0" smtClean="0"/>
-              <a:t>Thank You</a:t>
+              <a:t>Other Topics</a:t>
             </a:r>
             <a:endParaRPr lang="en-US" sz="7200" dirty="0"/>
           </a:p>
@@ -11142,13 +11176,47 @@
         </p:nvSpPr>
         <p:spPr/>
         <p:txBody>
-          <a:bodyPr/>
-          <a:lstStyle/>
-          <a:p>
-            <a:r>
-              <a:rPr lang="en-US" sz="3600" dirty="0"/>
-              <a:t>http://git/daleardi/ROPTalk.git</a:t>
-            </a:r>
+          <a:bodyPr>
+            <a:normAutofit fontScale="85000" lnSpcReduction="10000"/>
+          </a:bodyPr>
+          <a:lstStyle/>
+          <a:p>
+            <a:r>
+              <a:rPr lang="en-US" sz="3600" dirty="0" smtClean="0"/>
+              <a:t>Injecting functions into flow based on application inputs/configuration</a:t>
+            </a:r>
+          </a:p>
+          <a:p>
+            <a:r>
+              <a:rPr lang="en-US" sz="3600" dirty="0" smtClean="0"/>
+              <a:t>Adding Warning Messages to your success type</a:t>
+            </a:r>
+          </a:p>
+          <a:p>
+            <a:r>
+              <a:rPr lang="en-US" sz="3600" dirty="0" smtClean="0"/>
+              <a:t>Adding Warning Type: Three track model</a:t>
+            </a:r>
+          </a:p>
+          <a:p>
+            <a:r>
+              <a:rPr lang="en-US" sz="3600" dirty="0" smtClean="0"/>
+              <a:t>Doing this asynchronously </a:t>
+            </a:r>
+          </a:p>
+          <a:p>
+            <a:r>
+              <a:rPr lang="en-US" sz="3600" dirty="0" smtClean="0"/>
+              <a:t>Creating Computation Expression to do this </a:t>
+            </a:r>
+          </a:p>
+          <a:p>
+            <a:r>
+              <a:rPr lang="en-US" sz="3600" dirty="0" smtClean="0"/>
+              <a:t>Read Scott W.’s blog!</a:t>
+            </a:r>
+          </a:p>
+          <a:p>
             <a:endParaRPr lang="en-US" dirty="0"/>
           </a:p>
         </p:txBody>
@@ -11156,7 +11224,7 @@
     </p:spTree>
     <p:extLst>
       <p:ext uri="{BB962C8B-B14F-4D97-AF65-F5344CB8AC3E}">
-        <p14:creationId xmlns:p14="http://schemas.microsoft.com/office/powerpoint/2010/main" val="2627309380"/>
+        <p14:creationId xmlns:p14="http://schemas.microsoft.com/office/powerpoint/2010/main" val="756987525"/>
       </p:ext>
     </p:extLst>
   </p:cSld>
@@ -11611,6 +11679,89 @@
     <p:bldLst>
       <p:bldP spid="3" grpId="0" build="p"/>
     </p:bldLst>
+  </p:timing>
+</p:sld>
+</file>
+
+<file path=ppt/slides/slide30.xml><?xml version="1.0" encoding="utf-8"?>
+<p:sld xmlns:a="http://schemas.openxmlformats.org/drawingml/2006/main" xmlns:r="http://schemas.openxmlformats.org/officeDocument/2006/relationships" xmlns:p="http://schemas.openxmlformats.org/presentationml/2006/main">
+  <p:cSld>
+    <p:spTree>
+      <p:nvGrpSpPr>
+        <p:cNvPr id="1" name=""/>
+        <p:cNvGrpSpPr/>
+        <p:nvPr/>
+      </p:nvGrpSpPr>
+      <p:grpSpPr>
+        <a:xfrm>
+          <a:off x="0" y="0"/>
+          <a:ext cx="0" cy="0"/>
+          <a:chOff x="0" y="0"/>
+          <a:chExt cx="0" cy="0"/>
+        </a:xfrm>
+      </p:grpSpPr>
+      <p:sp>
+        <p:nvSpPr>
+          <p:cNvPr id="2" name="Title 1"/>
+          <p:cNvSpPr>
+            <a:spLocks noGrp="1"/>
+          </p:cNvSpPr>
+          <p:nvPr>
+            <p:ph type="title"/>
+          </p:nvPr>
+        </p:nvSpPr>
+        <p:spPr/>
+        <p:txBody>
+          <a:bodyPr/>
+          <a:lstStyle/>
+          <a:p>
+            <a:r>
+              <a:rPr lang="en-US" sz="7200" dirty="0" smtClean="0"/>
+              <a:t>Thank You</a:t>
+            </a:r>
+            <a:endParaRPr lang="en-US" sz="7200" dirty="0"/>
+          </a:p>
+        </p:txBody>
+      </p:sp>
+      <p:sp>
+        <p:nvSpPr>
+          <p:cNvPr id="3" name="Content Placeholder 2"/>
+          <p:cNvSpPr>
+            <a:spLocks noGrp="1"/>
+          </p:cNvSpPr>
+          <p:nvPr>
+            <p:ph idx="1"/>
+          </p:nvPr>
+        </p:nvSpPr>
+        <p:spPr/>
+        <p:txBody>
+          <a:bodyPr/>
+          <a:lstStyle/>
+          <a:p>
+            <a:r>
+              <a:rPr lang="en-US" sz="3600" dirty="0"/>
+              <a:t>http://git/daleardi/ROPTalk.git</a:t>
+            </a:r>
+            <a:endParaRPr lang="en-US" dirty="0"/>
+          </a:p>
+        </p:txBody>
+      </p:sp>
+    </p:spTree>
+    <p:extLst>
+      <p:ext uri="{BB962C8B-B14F-4D97-AF65-F5344CB8AC3E}">
+        <p14:creationId xmlns:p14="http://schemas.microsoft.com/office/powerpoint/2010/main" val="2627309380"/>
+      </p:ext>
+    </p:extLst>
+  </p:cSld>
+  <p:clrMapOvr>
+    <a:masterClrMapping/>
+  </p:clrMapOvr>
+  <p:timing>
+    <p:tnLst>
+      <p:par>
+        <p:cTn id="1" dur="indefinite" restart="never" nodeType="tmRoot"/>
+      </p:par>
+    </p:tnLst>
   </p:timing>
 </p:sld>
 </file>
@@ -12185,6 +12336,66 @@
       </p:grpSpPr>
       <p:sp>
         <p:nvSpPr>
+          <p:cNvPr id="2" name="Title 1"/>
+          <p:cNvSpPr>
+            <a:spLocks noGrp="1"/>
+          </p:cNvSpPr>
+          <p:nvPr>
+            <p:ph type="title"/>
+          </p:nvPr>
+        </p:nvSpPr>
+        <p:spPr>
+          <a:xfrm>
+            <a:off x="1290038" y="2732796"/>
+            <a:ext cx="8825657" cy="566738"/>
+          </a:xfrm>
+        </p:spPr>
+        <p:txBody>
+          <a:bodyPr>
+            <a:noAutofit/>
+          </a:bodyPr>
+          <a:lstStyle/>
+          <a:p>
+            <a:r>
+              <a:rPr lang="en-US" sz="4000" dirty="0" smtClean="0"/>
+              <a:t>Why Do We Use Static Typing?</a:t>
+            </a:r>
+            <a:endParaRPr lang="en-US" sz="4000" dirty="0"/>
+          </a:p>
+        </p:txBody>
+      </p:sp>
+    </p:spTree>
+    <p:extLst>
+      <p:ext uri="{BB962C8B-B14F-4D97-AF65-F5344CB8AC3E}">
+        <p14:creationId xmlns:p14="http://schemas.microsoft.com/office/powerpoint/2010/main" val="3965636648"/>
+      </p:ext>
+    </p:extLst>
+  </p:cSld>
+  <p:clrMapOvr>
+    <a:masterClrMapping/>
+  </p:clrMapOvr>
+</p:sld>
+</file>
+
+<file path=ppt/slides/slide6.xml><?xml version="1.0" encoding="utf-8"?>
+<p:sld xmlns:a="http://schemas.openxmlformats.org/drawingml/2006/main" xmlns:r="http://schemas.openxmlformats.org/officeDocument/2006/relationships" xmlns:p="http://schemas.openxmlformats.org/presentationml/2006/main">
+  <p:cSld>
+    <p:spTree>
+      <p:nvGrpSpPr>
+        <p:cNvPr id="1" name=""/>
+        <p:cNvGrpSpPr/>
+        <p:nvPr/>
+      </p:nvGrpSpPr>
+      <p:grpSpPr>
+        <a:xfrm>
+          <a:off x="0" y="0"/>
+          <a:ext cx="0" cy="0"/>
+          <a:chOff x="0" y="0"/>
+          <a:chExt cx="0" cy="0"/>
+        </a:xfrm>
+      </p:grpSpPr>
+      <p:sp>
+        <p:nvSpPr>
           <p:cNvPr id="10" name="Title 1"/>
           <p:cNvSpPr>
             <a:spLocks noGrp="1"/>
@@ -12257,7 +12468,7 @@
 </p:sld>
 </file>
 
-<file path=ppt/slides/slide6.xml><?xml version="1.0" encoding="utf-8"?>
+<file path=ppt/slides/slide7.xml><?xml version="1.0" encoding="utf-8"?>
 <p:sld xmlns:a="http://schemas.openxmlformats.org/drawingml/2006/main" xmlns:r="http://schemas.openxmlformats.org/officeDocument/2006/relationships" xmlns:p="http://schemas.openxmlformats.org/presentationml/2006/main">
   <p:cSld>
     <p:spTree>
@@ -12568,7 +12779,7 @@
 </p:sld>
 </file>
 
-<file path=ppt/slides/slide7.xml><?xml version="1.0" encoding="utf-8"?>
+<file path=ppt/slides/slide8.xml><?xml version="1.0" encoding="utf-8"?>
 <p:sld xmlns:a="http://schemas.openxmlformats.org/drawingml/2006/main" xmlns:r="http://schemas.openxmlformats.org/officeDocument/2006/relationships" xmlns:p="http://schemas.openxmlformats.org/presentationml/2006/main">
   <p:cSld>
     <p:spTree>
@@ -12879,7 +13090,7 @@
 </p:sld>
 </file>
 
-<file path=ppt/slides/slide8.xml><?xml version="1.0" encoding="utf-8"?>
+<file path=ppt/slides/slide9.xml><?xml version="1.0" encoding="utf-8"?>
 <p:sld xmlns:a="http://schemas.openxmlformats.org/drawingml/2006/main" xmlns:r="http://schemas.openxmlformats.org/officeDocument/2006/relationships" xmlns:p="http://schemas.openxmlformats.org/presentationml/2006/main">
   <p:cSld>
     <p:spTree>
@@ -13502,155 +13713,6 @@
     <p:bldLst>
       <p:bldP spid="2" grpId="0" build="p"/>
     </p:bldLst>
-  </p:timing>
-</p:sld>
-</file>
-
-<file path=ppt/slides/slide9.xml><?xml version="1.0" encoding="utf-8"?>
-<p:sld xmlns:a="http://schemas.openxmlformats.org/drawingml/2006/main" xmlns:r="http://schemas.openxmlformats.org/officeDocument/2006/relationships" xmlns:p="http://schemas.openxmlformats.org/presentationml/2006/main">
-  <p:cSld>
-    <p:spTree>
-      <p:nvGrpSpPr>
-        <p:cNvPr id="1" name=""/>
-        <p:cNvGrpSpPr/>
-        <p:nvPr/>
-      </p:nvGrpSpPr>
-      <p:grpSpPr>
-        <a:xfrm>
-          <a:off x="0" y="0"/>
-          <a:ext cx="0" cy="0"/>
-          <a:chOff x="0" y="0"/>
-          <a:chExt cx="0" cy="0"/>
-        </a:xfrm>
-      </p:grpSpPr>
-      <p:sp>
-        <p:nvSpPr>
-          <p:cNvPr id="10" name="Title 1"/>
-          <p:cNvSpPr>
-            <a:spLocks noGrp="1"/>
-          </p:cNvSpPr>
-          <p:nvPr>
-            <p:ph type="title"/>
-          </p:nvPr>
-        </p:nvSpPr>
-        <p:spPr>
-          <a:xfrm>
-            <a:off x="1586485" y="308126"/>
-            <a:ext cx="8563984" cy="1478570"/>
-          </a:xfrm>
-        </p:spPr>
-        <p:txBody>
-          <a:bodyPr>
-            <a:normAutofit/>
-          </a:bodyPr>
-          <a:lstStyle/>
-          <a:p>
-            <a:r>
-              <a:rPr lang="en-US" sz="7200" dirty="0" smtClean="0"/>
-              <a:t>What is ROP?</a:t>
-            </a:r>
-            <a:endParaRPr lang="en-US" sz="7200" dirty="0"/>
-          </a:p>
-        </p:txBody>
-      </p:sp>
-      <p:sp>
-        <p:nvSpPr>
-          <p:cNvPr id="3" name="TextBox 2"/>
-          <p:cNvSpPr txBox="1"/>
-          <p:nvPr/>
-        </p:nvSpPr>
-        <p:spPr>
-          <a:xfrm>
-            <a:off x="1330036" y="2535382"/>
-            <a:ext cx="7460673" cy="3539430"/>
-          </a:xfrm>
-          <a:prstGeom prst="rect">
-            <a:avLst/>
-          </a:prstGeom>
-          <a:noFill/>
-        </p:spPr>
-        <p:txBody>
-          <a:bodyPr wrap="square" rtlCol="0">
-            <a:spAutoFit/>
-          </a:bodyPr>
-          <a:lstStyle/>
-          <a:p>
-            <a:r>
-              <a:rPr lang="en-US" sz="3200" dirty="0" smtClean="0"/>
-              <a:t>Programming style to handle errors in a type safe way.  </a:t>
-            </a:r>
-          </a:p>
-          <a:p>
-            <a:endParaRPr lang="en-US" sz="3200" dirty="0"/>
-          </a:p>
-          <a:p>
-            <a:pPr marL="285750" indent="-285750">
-              <a:buFont typeface="Arial" panose="020B0604020202020204" pitchFamily="34" charset="0"/>
-              <a:buChar char="•"/>
-            </a:pPr>
-            <a:r>
-              <a:rPr lang="en-US" sz="3200" dirty="0"/>
-              <a:t>All of this stolen from Scott W</a:t>
-            </a:r>
-            <a:r>
-              <a:rPr lang="en-US" sz="3200" dirty="0" smtClean="0"/>
-              <a:t>.</a:t>
-            </a:r>
-          </a:p>
-          <a:p>
-            <a:pPr marL="285750" indent="-285750">
-              <a:buFont typeface="Arial" panose="020B0604020202020204" pitchFamily="34" charset="0"/>
-              <a:buChar char="•"/>
-            </a:pPr>
-            <a:r>
-              <a:rPr lang="en-US" sz="3200" dirty="0" smtClean="0"/>
-              <a:t>He has 2 videos and several blog posts</a:t>
-            </a:r>
-            <a:endParaRPr lang="en-US" sz="3200" dirty="0"/>
-          </a:p>
-          <a:p>
-            <a:pPr marL="285750" indent="-285750">
-              <a:buFont typeface="Arial" panose="020B0604020202020204" pitchFamily="34" charset="0"/>
-              <a:buChar char="•"/>
-            </a:pPr>
-            <a:r>
-              <a:rPr lang="en-US" sz="3200" dirty="0" smtClean="0">
-                <a:hlinkClick r:id="rId3"/>
-              </a:rPr>
-              <a:t>http</a:t>
-            </a:r>
-            <a:r>
-              <a:rPr lang="en-US" sz="3200" dirty="0">
-                <a:hlinkClick r:id="rId3"/>
-              </a:rPr>
-              <a:t>://fsharpforfunandprofit.com</a:t>
-            </a:r>
-            <a:r>
-              <a:rPr lang="en-US" sz="3200" dirty="0" smtClean="0">
-                <a:hlinkClick r:id="rId3"/>
-              </a:rPr>
-              <a:t>/</a:t>
-            </a:r>
-            <a:endParaRPr lang="en-US" sz="3200" dirty="0" smtClean="0"/>
-          </a:p>
-        </p:txBody>
-      </p:sp>
-    </p:spTree>
-    <p:extLst>
-      <p:ext uri="{BB962C8B-B14F-4D97-AF65-F5344CB8AC3E}">
-        <p14:creationId xmlns:p14="http://schemas.microsoft.com/office/powerpoint/2010/main" val="3247463652"/>
-      </p:ext>
-    </p:extLst>
-  </p:cSld>
-  <p:clrMapOvr>
-    <a:masterClrMapping/>
-  </p:clrMapOvr>
-  <p:timing>
-    <p:tnLst>
-      <p:par>
-        <p:cTn id="1" dur="indefinite" restart="never" nodeType="tmRoot"/>
-      </p:par>
-    </p:tnLst>
   </p:timing>
 </p:sld>
 </file>

</xml_diff>